<commit_message>
formatting changes to ppt
</commit_message>
<xml_diff>
--- a/NLP presentation.pptx
+++ b/NLP presentation.pptx
@@ -5,16 +5,16 @@
     <p:sldMasterId id="2147483648" r:id="rId1"/>
   </p:sldMasterIdLst>
   <p:notesMasterIdLst>
-    <p:notesMasterId r:id="rId18"/>
+    <p:notesMasterId r:id="rId20"/>
   </p:notesMasterIdLst>
   <p:sldIdLst>
-    <p:sldId id="261" r:id="rId2"/>
+    <p:sldId id="273" r:id="rId2"/>
     <p:sldId id="256" r:id="rId3"/>
     <p:sldId id="271" r:id="rId4"/>
     <p:sldId id="257" r:id="rId5"/>
-    <p:sldId id="260" r:id="rId6"/>
-    <p:sldId id="259" r:id="rId7"/>
-    <p:sldId id="258" r:id="rId8"/>
+    <p:sldId id="258" r:id="rId6"/>
+    <p:sldId id="260" r:id="rId7"/>
+    <p:sldId id="259" r:id="rId8"/>
     <p:sldId id="270" r:id="rId9"/>
     <p:sldId id="262" r:id="rId10"/>
     <p:sldId id="265" r:id="rId11"/>
@@ -24,6 +24,8 @@
     <p:sldId id="268" r:id="rId15"/>
     <p:sldId id="267" r:id="rId16"/>
     <p:sldId id="269" r:id="rId17"/>
+    <p:sldId id="272" r:id="rId18"/>
+    <p:sldId id="261" r:id="rId19"/>
   </p:sldIdLst>
   <p:sldSz cx="12192000" cy="6858000"/>
   <p:notesSz cx="6858000" cy="9144000"/>
@@ -608,6 +610,90 @@
 </p:notes>
 </file>
 
+<file path=ppt/notesSlides/notesSlide10.xml><?xml version="1.0" encoding="utf-8"?>
+<p:notes xmlns:a="http://schemas.openxmlformats.org/drawingml/2006/main" xmlns:r="http://schemas.openxmlformats.org/officeDocument/2006/relationships" xmlns:p="http://schemas.openxmlformats.org/presentationml/2006/main">
+  <p:cSld>
+    <p:spTree>
+      <p:nvGrpSpPr>
+        <p:cNvPr id="1" name=""/>
+        <p:cNvGrpSpPr/>
+        <p:nvPr/>
+      </p:nvGrpSpPr>
+      <p:grpSpPr>
+        <a:xfrm>
+          <a:off x="0" y="0"/>
+          <a:ext cx="0" cy="0"/>
+          <a:chOff x="0" y="0"/>
+          <a:chExt cx="0" cy="0"/>
+        </a:xfrm>
+      </p:grpSpPr>
+      <p:sp>
+        <p:nvSpPr>
+          <p:cNvPr id="2" name="Slide Image Placeholder 1"/>
+          <p:cNvSpPr>
+            <a:spLocks noGrp="1" noRot="1" noChangeAspect="1"/>
+          </p:cNvSpPr>
+          <p:nvPr>
+            <p:ph type="sldImg"/>
+          </p:nvPr>
+        </p:nvSpPr>
+        <p:spPr/>
+      </p:sp>
+      <p:sp>
+        <p:nvSpPr>
+          <p:cNvPr id="3" name="Notes Placeholder 2"/>
+          <p:cNvSpPr>
+            <a:spLocks noGrp="1"/>
+          </p:cNvSpPr>
+          <p:nvPr>
+            <p:ph type="body" idx="1"/>
+          </p:nvPr>
+        </p:nvSpPr>
+        <p:spPr/>
+        <p:txBody>
+          <a:bodyPr/>
+          <a:lstStyle/>
+          <a:p>
+            <a:endParaRPr lang="en-US" dirty="0"/>
+          </a:p>
+        </p:txBody>
+      </p:sp>
+      <p:sp>
+        <p:nvSpPr>
+          <p:cNvPr id="4" name="Slide Number Placeholder 3"/>
+          <p:cNvSpPr>
+            <a:spLocks noGrp="1"/>
+          </p:cNvSpPr>
+          <p:nvPr>
+            <p:ph type="sldNum" sz="quarter" idx="10"/>
+          </p:nvPr>
+        </p:nvSpPr>
+        <p:spPr/>
+        <p:txBody>
+          <a:bodyPr/>
+          <a:lstStyle/>
+          <a:p>
+            <a:fld id="{7AB22233-39AB-744A-95F6-AE3338E03E64}" type="slidenum">
+              <a:rPr lang="en-US" smtClean="0"/>
+              <a:t>17</a:t>
+            </a:fld>
+            <a:endParaRPr lang="en-US"/>
+          </a:p>
+        </p:txBody>
+      </p:sp>
+    </p:spTree>
+    <p:extLst>
+      <p:ext uri="{BB962C8B-B14F-4D97-AF65-F5344CB8AC3E}">
+        <p14:creationId xmlns:p14="http://schemas.microsoft.com/office/powerpoint/2010/main" val="1577523243"/>
+      </p:ext>
+    </p:extLst>
+  </p:cSld>
+  <p:clrMapOvr>
+    <a:masterClrMapping/>
+  </p:clrMapOvr>
+</p:notes>
+</file>
+
 <file path=ppt/notesSlides/notesSlide2.xml><?xml version="1.0" encoding="utf-8"?>
 <p:notes xmlns:a="http://schemas.openxmlformats.org/drawingml/2006/main" xmlns:r="http://schemas.openxmlformats.org/officeDocument/2006/relationships" xmlns:p="http://schemas.openxmlformats.org/presentationml/2006/main">
   <p:cSld>
@@ -653,19 +739,47 @@
           <a:lstStyle/>
           <a:p>
             <a:r>
-              <a:rPr lang="en-US" dirty="0" smtClean="0"/>
-              <a:t>Do you take things literally or not?</a:t>
-            </a:r>
-          </a:p>
-          <a:p>
-            <a:r>
-              <a:rPr lang="en-US" dirty="0" smtClean="0"/>
-              <a:t>What’s the</a:t>
-            </a:r>
-            <a:r>
-              <a:rPr lang="en-US" baseline="0" dirty="0" smtClean="0"/>
-              <a:t> intention? Asking a person’s opinion, or asking for reciprocation? Making a request? </a:t>
-            </a:r>
+              <a:rPr lang="en-US" sz="1200" b="0" i="0" kern="1200" dirty="0" smtClean="0">
+                <a:solidFill>
+                  <a:schemeClr val="tx1"/>
+                </a:solidFill>
+                <a:effectLst/>
+                <a:latin typeface="+mn-lt"/>
+                <a:ea typeface="+mn-ea"/>
+                <a:cs typeface="+mn-cs"/>
+              </a:rPr>
+              <a:t>Structuring a highly unstructured data source</a:t>
+            </a:r>
+          </a:p>
+          <a:p>
+            <a:r>
+              <a:rPr lang="en-US" sz="1200" b="0" i="0" kern="1200" dirty="0" smtClean="0">
+                <a:solidFill>
+                  <a:schemeClr val="tx1"/>
+                </a:solidFill>
+                <a:effectLst/>
+                <a:latin typeface="+mn-lt"/>
+                <a:ea typeface="+mn-ea"/>
+                <a:cs typeface="+mn-cs"/>
+              </a:rPr>
+              <a:t>Human language is astoundingly complex and diverse. We express ourselves in infinite ways, both verbally and in writing. Not only are there hundreds of languages and dialects, but within each language is a unique set of grammar and syntax rules, terms and slang. When we write, we often misspell or abbreviate words, or omit punctuation. When we speak, we have regional accents, and we mumble, stutter and borrow terms from other languages. </a:t>
+            </a:r>
+          </a:p>
+          <a:p>
+            <a:r>
+              <a:rPr lang="en-US" sz="1200" b="0" i="0" kern="1200" dirty="0" smtClean="0">
+                <a:solidFill>
+                  <a:schemeClr val="tx1"/>
+                </a:solidFill>
+                <a:effectLst/>
+                <a:latin typeface="+mn-lt"/>
+                <a:ea typeface="+mn-ea"/>
+                <a:cs typeface="+mn-cs"/>
+              </a:rPr>
+              <a:t>While supervised and unsupervised learning, and specifically deep learning, are now widely used for modeling human language, there’s also a need for syntactic and semantic understanding and domain expertise that are not necessarily present in these machine learning approaches. NLP is important because it helps resolve ambiguity in language and adds useful numeric structure to the data for many downstream applications, such as speech recognition or text analytics. </a:t>
+            </a:r>
+          </a:p>
+          <a:p>
             <a:endParaRPr lang="en-US" dirty="0"/>
           </a:p>
         </p:txBody>
@@ -696,7 +810,7 @@
     </p:spTree>
     <p:extLst>
       <p:ext uri="{BB962C8B-B14F-4D97-AF65-F5344CB8AC3E}">
-        <p14:creationId xmlns:p14="http://schemas.microsoft.com/office/powerpoint/2010/main" val="1914620757"/>
+        <p14:creationId xmlns:p14="http://schemas.microsoft.com/office/powerpoint/2010/main" val="1279975475"/>
       </p:ext>
     </p:extLst>
   </p:cSld>
@@ -751,47 +865,19 @@
           <a:lstStyle/>
           <a:p>
             <a:r>
-              <a:rPr lang="en-US" sz="1200" b="0" i="0" kern="1200" dirty="0" smtClean="0">
-                <a:solidFill>
-                  <a:schemeClr val="tx1"/>
-                </a:solidFill>
-                <a:effectLst/>
-                <a:latin typeface="+mn-lt"/>
-                <a:ea typeface="+mn-ea"/>
-                <a:cs typeface="+mn-cs"/>
-              </a:rPr>
-              <a:t>Structuring a highly unstructured data source</a:t>
-            </a:r>
-          </a:p>
-          <a:p>
-            <a:r>
-              <a:rPr lang="en-US" sz="1200" b="0" i="0" kern="1200" dirty="0" smtClean="0">
-                <a:solidFill>
-                  <a:schemeClr val="tx1"/>
-                </a:solidFill>
-                <a:effectLst/>
-                <a:latin typeface="+mn-lt"/>
-                <a:ea typeface="+mn-ea"/>
-                <a:cs typeface="+mn-cs"/>
-              </a:rPr>
-              <a:t>Human language is astoundingly complex and diverse. We express ourselves in infinite ways, both verbally and in writing. Not only are there hundreds of languages and dialects, but within each language is a unique set of grammar and syntax rules, terms and slang. When we write, we often misspell or abbreviate words, or omit punctuation. When we speak, we have regional accents, and we mumble, stutter and borrow terms from other languages. </a:t>
-            </a:r>
-          </a:p>
-          <a:p>
-            <a:r>
-              <a:rPr lang="en-US" sz="1200" b="0" i="0" kern="1200" dirty="0" smtClean="0">
-                <a:solidFill>
-                  <a:schemeClr val="tx1"/>
-                </a:solidFill>
-                <a:effectLst/>
-                <a:latin typeface="+mn-lt"/>
-                <a:ea typeface="+mn-ea"/>
-                <a:cs typeface="+mn-cs"/>
-              </a:rPr>
-              <a:t>While supervised and unsupervised learning, and specifically deep learning, are now widely used for modeling human language, there’s also a need for syntactic and semantic understanding and domain expertise that are not necessarily present in these machine learning approaches. NLP is important because it helps resolve ambiguity in language and adds useful numeric structure to the data for many downstream applications, such as speech recognition or text analytics. </a:t>
-            </a:r>
-          </a:p>
-          <a:p>
+              <a:rPr lang="en-US" dirty="0" smtClean="0"/>
+              <a:t>Do you take things literally or not?</a:t>
+            </a:r>
+          </a:p>
+          <a:p>
+            <a:r>
+              <a:rPr lang="en-US" dirty="0" smtClean="0"/>
+              <a:t>What’s the</a:t>
+            </a:r>
+            <a:r>
+              <a:rPr lang="en-US" baseline="0" dirty="0" smtClean="0"/>
+              <a:t> intention? Asking a person’s opinion, or asking for reciprocation? Making a request? </a:t>
+            </a:r>
             <a:endParaRPr lang="en-US" dirty="0"/>
           </a:p>
         </p:txBody>
@@ -813,7 +899,7 @@
           <a:p>
             <a:fld id="{7AB22233-39AB-744A-95F6-AE3338E03E64}" type="slidenum">
               <a:rPr lang="en-US" smtClean="0"/>
-              <a:t>7</a:t>
+              <a:t>6</a:t>
             </a:fld>
             <a:endParaRPr lang="en-US"/>
           </a:p>
@@ -822,7 +908,7 @@
     </p:spTree>
     <p:extLst>
       <p:ext uri="{BB962C8B-B14F-4D97-AF65-F5344CB8AC3E}">
-        <p14:creationId xmlns:p14="http://schemas.microsoft.com/office/powerpoint/2010/main" val="1279975475"/>
+        <p14:creationId xmlns:p14="http://schemas.microsoft.com/office/powerpoint/2010/main" val="1914620757"/>
       </p:ext>
     </p:extLst>
   </p:cSld>
@@ -7456,7 +7542,7 @@
     </p:spTree>
     <p:extLst>
       <p:ext uri="{BB962C8B-B14F-4D97-AF65-F5344CB8AC3E}">
-        <p14:creationId xmlns:p14="http://schemas.microsoft.com/office/powerpoint/2010/main" val="1491691568"/>
+        <p14:creationId xmlns:p14="http://schemas.microsoft.com/office/powerpoint/2010/main" val="1338802680"/>
       </p:ext>
     </p:extLst>
   </p:cSld>
@@ -7585,7 +7671,120 @@
   <p:timing>
     <p:tnLst>
       <p:par>
-        <p:cTn id="1" dur="indefinite" restart="never" nodeType="tmRoot"/>
+        <p:cTn id="1" dur="indefinite" restart="never" nodeType="tmRoot">
+          <p:childTnLst>
+            <p:seq concurrent="1" nextAc="seek">
+              <p:cTn id="2" dur="indefinite" nodeType="mainSeq">
+                <p:childTnLst>
+                  <p:par>
+                    <p:cTn id="3" fill="hold">
+                      <p:stCondLst>
+                        <p:cond delay="indefinite"/>
+                      </p:stCondLst>
+                      <p:childTnLst>
+                        <p:par>
+                          <p:cTn id="4" fill="hold">
+                            <p:stCondLst>
+                              <p:cond delay="0"/>
+                            </p:stCondLst>
+                            <p:childTnLst>
+                              <p:par>
+                                <p:cTn id="5" presetID="1" presetClass="entr" presetSubtype="0" fill="hold" nodeType="clickEffect">
+                                  <p:stCondLst>
+                                    <p:cond delay="0"/>
+                                  </p:stCondLst>
+                                  <p:childTnLst>
+                                    <p:set>
+                                      <p:cBhvr>
+                                        <p:cTn id="6" dur="1" fill="hold">
+                                          <p:stCondLst>
+                                            <p:cond delay="0"/>
+                                          </p:stCondLst>
+                                        </p:cTn>
+                                        <p:tgtEl>
+                                          <p:spTgt spid="4"/>
+                                        </p:tgtEl>
+                                        <p:attrNameLst>
+                                          <p:attrName>style.visibility</p:attrName>
+                                        </p:attrNameLst>
+                                      </p:cBhvr>
+                                      <p:to>
+                                        <p:strVal val="visible"/>
+                                      </p:to>
+                                    </p:set>
+                                  </p:childTnLst>
+                                </p:cTn>
+                              </p:par>
+                            </p:childTnLst>
+                          </p:cTn>
+                        </p:par>
+                      </p:childTnLst>
+                    </p:cTn>
+                  </p:par>
+                  <p:par>
+                    <p:cTn id="7" fill="hold">
+                      <p:stCondLst>
+                        <p:cond delay="indefinite"/>
+                      </p:stCondLst>
+                      <p:childTnLst>
+                        <p:par>
+                          <p:cTn id="8" fill="hold">
+                            <p:stCondLst>
+                              <p:cond delay="0"/>
+                            </p:stCondLst>
+                            <p:childTnLst>
+                              <p:par>
+                                <p:cTn id="9" presetID="1" presetClass="entr" presetSubtype="0" fill="hold" nodeType="clickEffect">
+                                  <p:stCondLst>
+                                    <p:cond delay="0"/>
+                                  </p:stCondLst>
+                                  <p:childTnLst>
+                                    <p:set>
+                                      <p:cBhvr>
+                                        <p:cTn id="10" dur="1" fill="hold">
+                                          <p:stCondLst>
+                                            <p:cond delay="0"/>
+                                          </p:stCondLst>
+                                        </p:cTn>
+                                        <p:tgtEl>
+                                          <p:spTgt spid="5"/>
+                                        </p:tgtEl>
+                                        <p:attrNameLst>
+                                          <p:attrName>style.visibility</p:attrName>
+                                        </p:attrNameLst>
+                                      </p:cBhvr>
+                                      <p:to>
+                                        <p:strVal val="visible"/>
+                                      </p:to>
+                                    </p:set>
+                                  </p:childTnLst>
+                                </p:cTn>
+                              </p:par>
+                            </p:childTnLst>
+                          </p:cTn>
+                        </p:par>
+                      </p:childTnLst>
+                    </p:cTn>
+                  </p:par>
+                </p:childTnLst>
+              </p:cTn>
+              <p:prevCondLst>
+                <p:cond evt="onPrev" delay="0">
+                  <p:tgtEl>
+                    <p:sldTgt/>
+                  </p:tgtEl>
+                </p:cond>
+              </p:prevCondLst>
+              <p:nextCondLst>
+                <p:cond evt="onNext" delay="0">
+                  <p:tgtEl>
+                    <p:sldTgt/>
+                  </p:tgtEl>
+                </p:cond>
+              </p:nextCondLst>
+            </p:seq>
+          </p:childTnLst>
+        </p:cTn>
       </p:par>
     </p:tnLst>
   </p:timing>
@@ -7807,7 +8006,120 @@
   <p:timing>
     <p:tnLst>
       <p:par>
-        <p:cTn id="1" dur="indefinite" restart="never" nodeType="tmRoot"/>
+        <p:cTn id="1" dur="indefinite" restart="never" nodeType="tmRoot">
+          <p:childTnLst>
+            <p:seq concurrent="1" nextAc="seek">
+              <p:cTn id="2" dur="indefinite" nodeType="mainSeq">
+                <p:childTnLst>
+                  <p:par>
+                    <p:cTn id="3" fill="hold">
+                      <p:stCondLst>
+                        <p:cond delay="indefinite"/>
+                      </p:stCondLst>
+                      <p:childTnLst>
+                        <p:par>
+                          <p:cTn id="4" fill="hold">
+                            <p:stCondLst>
+                              <p:cond delay="0"/>
+                            </p:stCondLst>
+                            <p:childTnLst>
+                              <p:par>
+                                <p:cTn id="5" presetID="1" presetClass="entr" presetSubtype="0" fill="hold" nodeType="clickEffect">
+                                  <p:stCondLst>
+                                    <p:cond delay="0"/>
+                                  </p:stCondLst>
+                                  <p:childTnLst>
+                                    <p:set>
+                                      <p:cBhvr>
+                                        <p:cTn id="6" dur="1" fill="hold">
+                                          <p:stCondLst>
+                                            <p:cond delay="0"/>
+                                          </p:stCondLst>
+                                        </p:cTn>
+                                        <p:tgtEl>
+                                          <p:spTgt spid="4"/>
+                                        </p:tgtEl>
+                                        <p:attrNameLst>
+                                          <p:attrName>style.visibility</p:attrName>
+                                        </p:attrNameLst>
+                                      </p:cBhvr>
+                                      <p:to>
+                                        <p:strVal val="visible"/>
+                                      </p:to>
+                                    </p:set>
+                                  </p:childTnLst>
+                                </p:cTn>
+                              </p:par>
+                            </p:childTnLst>
+                          </p:cTn>
+                        </p:par>
+                      </p:childTnLst>
+                    </p:cTn>
+                  </p:par>
+                  <p:par>
+                    <p:cTn id="7" fill="hold">
+                      <p:stCondLst>
+                        <p:cond delay="indefinite"/>
+                      </p:stCondLst>
+                      <p:childTnLst>
+                        <p:par>
+                          <p:cTn id="8" fill="hold">
+                            <p:stCondLst>
+                              <p:cond delay="0"/>
+                            </p:stCondLst>
+                            <p:childTnLst>
+                              <p:par>
+                                <p:cTn id="9" presetID="1" presetClass="entr" presetSubtype="0" fill="hold" nodeType="clickEffect">
+                                  <p:stCondLst>
+                                    <p:cond delay="0"/>
+                                  </p:stCondLst>
+                                  <p:childTnLst>
+                                    <p:set>
+                                      <p:cBhvr>
+                                        <p:cTn id="10" dur="1" fill="hold">
+                                          <p:stCondLst>
+                                            <p:cond delay="0"/>
+                                          </p:stCondLst>
+                                        </p:cTn>
+                                        <p:tgtEl>
+                                          <p:spTgt spid="5"/>
+                                        </p:tgtEl>
+                                        <p:attrNameLst>
+                                          <p:attrName>style.visibility</p:attrName>
+                                        </p:attrNameLst>
+                                      </p:cBhvr>
+                                      <p:to>
+                                        <p:strVal val="visible"/>
+                                      </p:to>
+                                    </p:set>
+                                  </p:childTnLst>
+                                </p:cTn>
+                              </p:par>
+                            </p:childTnLst>
+                          </p:cTn>
+                        </p:par>
+                      </p:childTnLst>
+                    </p:cTn>
+                  </p:par>
+                </p:childTnLst>
+              </p:cTn>
+              <p:prevCondLst>
+                <p:cond evt="onPrev" delay="0">
+                  <p:tgtEl>
+                    <p:sldTgt/>
+                  </p:tgtEl>
+                </p:cond>
+              </p:prevCondLst>
+              <p:nextCondLst>
+                <p:cond evt="onNext" delay="0">
+                  <p:tgtEl>
+                    <p:sldTgt/>
+                  </p:tgtEl>
+                </p:cond>
+              </p:nextCondLst>
+            </p:seq>
+          </p:childTnLst>
+        </p:cTn>
       </p:par>
     </p:tnLst>
   </p:timing>
@@ -7866,55 +8178,57 @@
         </p:nvSpPr>
         <p:spPr/>
         <p:txBody>
-          <a:bodyPr/>
-          <a:lstStyle/>
-          <a:p>
-            <a:r>
-              <a:rPr lang="en-US" dirty="0" smtClean="0"/>
+          <a:bodyPr>
+            <a:noAutofit/>
+          </a:bodyPr>
+          <a:lstStyle/>
+          <a:p>
+            <a:r>
+              <a:rPr lang="en-US" sz="2800" dirty="0" smtClean="0"/>
               <a:t>Sentiment Analysis</a:t>
             </a:r>
           </a:p>
           <a:p>
             <a:r>
-              <a:rPr lang="en-US" dirty="0"/>
+              <a:rPr lang="en-US" sz="2800" dirty="0"/>
               <a:t>Context </a:t>
             </a:r>
             <a:r>
-              <a:rPr lang="en-US" dirty="0" smtClean="0"/>
+              <a:rPr lang="en-US" sz="2800" dirty="0" smtClean="0"/>
               <a:t>Extraction</a:t>
             </a:r>
           </a:p>
           <a:p>
             <a:r>
-              <a:rPr lang="en-US" dirty="0"/>
+              <a:rPr lang="en-US" sz="2800" dirty="0"/>
               <a:t>Summarization</a:t>
             </a:r>
-            <a:endParaRPr lang="en-US" dirty="0" smtClean="0"/>
-          </a:p>
-          <a:p>
-            <a:r>
-              <a:rPr lang="en-US" dirty="0" smtClean="0"/>
+            <a:endParaRPr lang="en-US" sz="2800" dirty="0" smtClean="0"/>
+          </a:p>
+          <a:p>
+            <a:r>
+              <a:rPr lang="en-US" sz="2800" dirty="0" smtClean="0"/>
               <a:t>Content Categorization</a:t>
             </a:r>
           </a:p>
           <a:p>
             <a:r>
-              <a:rPr lang="en-US" dirty="0" smtClean="0"/>
+              <a:rPr lang="en-US" sz="2800" dirty="0" smtClean="0"/>
               <a:t>Topic Modeling</a:t>
             </a:r>
           </a:p>
           <a:p>
             <a:r>
-              <a:rPr lang="en-US" dirty="0" smtClean="0"/>
+              <a:rPr lang="en-US" sz="2800" dirty="0" smtClean="0"/>
               <a:t>Speech to Text, Text to Speech</a:t>
             </a:r>
           </a:p>
           <a:p>
             <a:r>
-              <a:rPr lang="en-US" dirty="0" smtClean="0"/>
+              <a:rPr lang="en-US" sz="2800" dirty="0" smtClean="0"/>
               <a:t>Machine Translation and Interpretation</a:t>
             </a:r>
-            <a:endParaRPr lang="en-US" dirty="0"/>
+            <a:endParaRPr lang="en-US" sz="2800" dirty="0"/>
           </a:p>
         </p:txBody>
       </p:sp>
@@ -8220,6 +8534,388 @@
 </p:sld>
 </file>
 
+<file path=ppt/slides/slide17.xml><?xml version="1.0" encoding="utf-8"?>
+<p:sld xmlns:a="http://schemas.openxmlformats.org/drawingml/2006/main" xmlns:r="http://schemas.openxmlformats.org/officeDocument/2006/relationships" xmlns:p="http://schemas.openxmlformats.org/presentationml/2006/main">
+  <p:cSld>
+    <p:spTree>
+      <p:nvGrpSpPr>
+        <p:cNvPr id="1" name=""/>
+        <p:cNvGrpSpPr/>
+        <p:nvPr/>
+      </p:nvGrpSpPr>
+      <p:grpSpPr>
+        <a:xfrm>
+          <a:off x="0" y="0"/>
+          <a:ext cx="0" cy="0"/>
+          <a:chOff x="0" y="0"/>
+          <a:chExt cx="0" cy="0"/>
+        </a:xfrm>
+      </p:grpSpPr>
+      <p:sp>
+        <p:nvSpPr>
+          <p:cNvPr id="2" name="Title 1"/>
+          <p:cNvSpPr>
+            <a:spLocks noGrp="1"/>
+          </p:cNvSpPr>
+          <p:nvPr>
+            <p:ph type="title"/>
+          </p:nvPr>
+        </p:nvSpPr>
+        <p:spPr/>
+        <p:txBody>
+          <a:bodyPr/>
+          <a:lstStyle/>
+          <a:p>
+            <a:r>
+              <a:rPr lang="en-US" dirty="0" smtClean="0"/>
+              <a:t>bibliography</a:t>
+            </a:r>
+            <a:endParaRPr lang="en-US" dirty="0"/>
+          </a:p>
+        </p:txBody>
+      </p:sp>
+      <p:sp>
+        <p:nvSpPr>
+          <p:cNvPr id="3" name="Content Placeholder 2"/>
+          <p:cNvSpPr>
+            <a:spLocks noGrp="1"/>
+          </p:cNvSpPr>
+          <p:nvPr>
+            <p:ph idx="1"/>
+          </p:nvPr>
+        </p:nvSpPr>
+        <p:spPr>
+          <a:xfrm>
+            <a:off x="685801" y="2142067"/>
+            <a:ext cx="10131425" cy="4547491"/>
+          </a:xfrm>
+        </p:spPr>
+        <p:txBody>
+          <a:bodyPr>
+            <a:normAutofit fontScale="92500" lnSpcReduction="10000"/>
+          </a:bodyPr>
+          <a:lstStyle/>
+          <a:p>
+            <a:r>
+              <a:rPr lang="en-US" dirty="0">
+                <a:hlinkClick r:id="rId3"/>
+              </a:rPr>
+              <a:t>https://</a:t>
+            </a:r>
+            <a:r>
+              <a:rPr lang="en-US" dirty="0" smtClean="0">
+                <a:hlinkClick r:id="rId3"/>
+              </a:rPr>
+              <a:t>www.sas.com/en_us/insights/analytics/what-is-natural-language-processing-nlp.html</a:t>
+            </a:r>
+            <a:endParaRPr lang="en-US" dirty="0"/>
+          </a:p>
+          <a:p>
+            <a:r>
+              <a:rPr lang="en-US" dirty="0">
+                <a:hlinkClick r:id="rId4"/>
+              </a:rPr>
+              <a:t>https://</a:t>
+            </a:r>
+            <a:r>
+              <a:rPr lang="en-US" dirty="0" smtClean="0">
+                <a:hlinkClick r:id="rId4"/>
+              </a:rPr>
+              <a:t>towardsdatascience.com/an-easy-introduction-to-natural-language-processing-b1e2801291c1</a:t>
+            </a:r>
+            <a:endParaRPr lang="en-US" dirty="0"/>
+          </a:p>
+          <a:p>
+            <a:r>
+              <a:rPr lang="en-US" dirty="0">
+                <a:hlinkClick r:id="rId5"/>
+              </a:rPr>
+              <a:t>https://www.altoros.com/blog/natural-language-processing-saves-businesses-millions-of-dollars</a:t>
+            </a:r>
+            <a:r>
+              <a:rPr lang="en-US" dirty="0" smtClean="0">
+                <a:hlinkClick r:id="rId5"/>
+              </a:rPr>
+              <a:t>/</a:t>
+            </a:r>
+            <a:endParaRPr lang="en-US" dirty="0"/>
+          </a:p>
+          <a:p>
+            <a:r>
+              <a:rPr lang="en-US" dirty="0">
+                <a:hlinkClick r:id="rId6"/>
+              </a:rPr>
+              <a:t>https://www.slideshare.net/secret/nOMzKg6innooJG</a:t>
+            </a:r>
+            <a:endParaRPr lang="en-US" dirty="0"/>
+          </a:p>
+          <a:p>
+            <a:r>
+              <a:rPr lang="en-US" dirty="0" smtClean="0">
+                <a:hlinkClick r:id="rId7"/>
+              </a:rPr>
+              <a:t>https</a:t>
+            </a:r>
+            <a:r>
+              <a:rPr lang="en-US" dirty="0">
+                <a:hlinkClick r:id="rId7"/>
+              </a:rPr>
+              <a:t>://</a:t>
+            </a:r>
+            <a:r>
+              <a:rPr lang="en-US" dirty="0" smtClean="0">
+                <a:hlinkClick r:id="rId7"/>
+              </a:rPr>
+              <a:t>nlp.stanford.edu/IR-book/html/htmledition/tokenization-1.html</a:t>
+            </a:r>
+            <a:endParaRPr lang="en-US" dirty="0"/>
+          </a:p>
+          <a:p>
+            <a:r>
+              <a:rPr lang="en-US" dirty="0">
+                <a:hlinkClick r:id="rId8"/>
+              </a:rPr>
+              <a:t>https://</a:t>
+            </a:r>
+            <a:r>
+              <a:rPr lang="en-US" dirty="0" smtClean="0">
+                <a:hlinkClick r:id="rId8"/>
+              </a:rPr>
+              <a:t>nlp.stanford.edu/IR-book/html/htmledition/stemming-and-lemmatization-1.html</a:t>
+            </a:r>
+            <a:endParaRPr lang="en-US" dirty="0"/>
+          </a:p>
+          <a:p>
+            <a:r>
+              <a:rPr lang="en-US" dirty="0">
+                <a:hlinkClick r:id="rId9"/>
+              </a:rPr>
+              <a:t>https://medium.com/@</a:t>
+            </a:r>
+            <a:r>
+              <a:rPr lang="en-US" dirty="0" smtClean="0">
+                <a:hlinkClick r:id="rId9"/>
+              </a:rPr>
+              <a:t>ageitgey/text-classification-is-your-new-secret-weapon-7ca4fad15788</a:t>
+            </a:r>
+            <a:endParaRPr lang="en-US" dirty="0"/>
+          </a:p>
+          <a:p>
+            <a:r>
+              <a:rPr lang="en-US" dirty="0">
+                <a:hlinkClick r:id="rId10"/>
+              </a:rPr>
+              <a:t>https://www.sas.com/en_us/insights/articles/analytics/using-analytics-to-prevent-sepsis.html</a:t>
+            </a:r>
+            <a:r>
+              <a:rPr lang="en-US" dirty="0" smtClean="0">
+                <a:hlinkClick r:id="rId10"/>
+              </a:rPr>
+              <a:t>#/</a:t>
+            </a:r>
+            <a:endParaRPr lang="en-US" dirty="0"/>
+          </a:p>
+          <a:p>
+            <a:r>
+              <a:rPr lang="en-US" dirty="0">
+                <a:hlinkClick r:id="rId11"/>
+              </a:rPr>
+              <a:t>https://blog.algorithmia.com/introduction-natural-language-processing-nlp</a:t>
+            </a:r>
+            <a:r>
+              <a:rPr lang="en-US" dirty="0" smtClean="0">
+                <a:hlinkClick r:id="rId11"/>
+              </a:rPr>
+              <a:t>/</a:t>
+            </a:r>
+            <a:endParaRPr lang="en-US" dirty="0"/>
+          </a:p>
+          <a:p>
+            <a:r>
+              <a:rPr lang="en-US" dirty="0">
+                <a:hlinkClick r:id="rId12"/>
+              </a:rPr>
+              <a:t>https://blog.algorithmia.com/create-your-own-machine-learning-powered-rss</a:t>
+            </a:r>
+            <a:r>
+              <a:rPr lang="en-US" dirty="0" smtClean="0">
+                <a:hlinkClick r:id="rId12"/>
+              </a:rPr>
+              <a:t>/</a:t>
+            </a:r>
+            <a:endParaRPr lang="en-US" dirty="0"/>
+          </a:p>
+          <a:p>
+            <a:r>
+              <a:rPr lang="en-US" dirty="0">
+                <a:hlinkClick r:id="rId13"/>
+              </a:rPr>
+              <a:t>https://</a:t>
+            </a:r>
+            <a:r>
+              <a:rPr lang="en-US" dirty="0" smtClean="0">
+                <a:hlinkClick r:id="rId13"/>
+              </a:rPr>
+              <a:t>blog.bitsrc.io/11-javascript-machine-learning-libraries-to-use-in-your-app-c49772cca46c</a:t>
+            </a:r>
+            <a:endParaRPr lang="en-US" dirty="0" smtClean="0"/>
+          </a:p>
+          <a:p>
+            <a:r>
+              <a:rPr lang="en-US" dirty="0" smtClean="0">
+                <a:hlinkClick r:id="rId14"/>
+              </a:rPr>
+              <a:t>https</a:t>
+            </a:r>
+            <a:r>
+              <a:rPr lang="en-US" dirty="0">
+                <a:hlinkClick r:id="rId14"/>
+              </a:rPr>
+              <a:t>://www.kdnuggets.com/2018/08/emotion-sentiment-analysis-practitioners-guide-nlp-5.html</a:t>
+            </a:r>
+            <a:endParaRPr lang="en-US" dirty="0"/>
+          </a:p>
+          <a:p>
+            <a:endParaRPr lang="en-US" dirty="0"/>
+          </a:p>
+        </p:txBody>
+      </p:sp>
+    </p:spTree>
+    <p:extLst>
+      <p:ext uri="{BB962C8B-B14F-4D97-AF65-F5344CB8AC3E}">
+        <p14:creationId xmlns:p14="http://schemas.microsoft.com/office/powerpoint/2010/main" val="819968188"/>
+      </p:ext>
+    </p:extLst>
+  </p:cSld>
+  <p:clrMapOvr>
+    <a:masterClrMapping/>
+  </p:clrMapOvr>
+  <p:timing>
+    <p:tnLst>
+      <p:par>
+        <p:cTn id="1" dur="indefinite" restart="never" nodeType="tmRoot"/>
+      </p:par>
+    </p:tnLst>
+  </p:timing>
+</p:sld>
+</file>
+
+<file path=ppt/slides/slide18.xml><?xml version="1.0" encoding="utf-8"?>
+<p:sld xmlns:a="http://schemas.openxmlformats.org/drawingml/2006/main" xmlns:r="http://schemas.openxmlformats.org/officeDocument/2006/relationships" xmlns:p="http://schemas.openxmlformats.org/presentationml/2006/main">
+  <p:cSld>
+    <p:spTree>
+      <p:nvGrpSpPr>
+        <p:cNvPr id="1" name=""/>
+        <p:cNvGrpSpPr/>
+        <p:nvPr/>
+      </p:nvGrpSpPr>
+      <p:grpSpPr>
+        <a:xfrm>
+          <a:off x="0" y="0"/>
+          <a:ext cx="0" cy="0"/>
+          <a:chOff x="0" y="0"/>
+          <a:chExt cx="0" cy="0"/>
+        </a:xfrm>
+      </p:grpSpPr>
+      <p:sp>
+        <p:nvSpPr>
+          <p:cNvPr id="2" name="Title 1"/>
+          <p:cNvSpPr>
+            <a:spLocks noGrp="1"/>
+          </p:cNvSpPr>
+          <p:nvPr>
+            <p:ph type="title"/>
+          </p:nvPr>
+        </p:nvSpPr>
+        <p:spPr/>
+        <p:txBody>
+          <a:bodyPr/>
+          <a:lstStyle/>
+          <a:p>
+            <a:endParaRPr lang="en-US"/>
+          </a:p>
+        </p:txBody>
+      </p:sp>
+      <p:sp>
+        <p:nvSpPr>
+          <p:cNvPr id="3" name="Content Placeholder 2"/>
+          <p:cNvSpPr>
+            <a:spLocks noGrp="1"/>
+          </p:cNvSpPr>
+          <p:nvPr>
+            <p:ph idx="1"/>
+          </p:nvPr>
+        </p:nvSpPr>
+        <p:spPr/>
+        <p:txBody>
+          <a:bodyPr/>
+          <a:lstStyle/>
+          <a:p>
+            <a:endParaRPr lang="en-US"/>
+          </a:p>
+        </p:txBody>
+      </p:sp>
+      <p:pic>
+        <p:nvPicPr>
+          <p:cNvPr id="2050" name="Picture 2" descr="https://cdn-images-1.medium.com/max/2000/1*5zWytCwc7aspMWtmGlxCWQ.jpeg"/>
+          <p:cNvPicPr>
+            <a:picLocks noChangeAspect="1" noChangeArrowheads="1"/>
+          </p:cNvPicPr>
+          <p:nvPr/>
+        </p:nvPicPr>
+        <p:blipFill>
+          <a:blip r:embed="rId2">
+            <a:extLst>
+              <a:ext uri="{28A0092B-C50C-407E-A947-70E740481C1C}">
+                <a14:useLocalDpi xmlns:a14="http://schemas.microsoft.com/office/drawing/2010/main" val="0"/>
+              </a:ext>
+            </a:extLst>
+          </a:blip>
+          <a:srcRect/>
+          <a:stretch>
+            <a:fillRect/>
+          </a:stretch>
+        </p:blipFill>
+        <p:spPr bwMode="auto">
+          <a:xfrm>
+            <a:off x="-905933" y="0"/>
+            <a:ext cx="13939024" cy="6858000"/>
+          </a:xfrm>
+          <a:prstGeom prst="rect">
+            <a:avLst/>
+          </a:prstGeom>
+          <a:noFill/>
+          <a:extLst>
+            <a:ext uri="{909E8E84-426E-40DD-AFC4-6F175D3DCCD1}">
+              <a14:hiddenFill xmlns:a14="http://schemas.microsoft.com/office/drawing/2010/main">
+                <a:solidFill>
+                  <a:srgbClr val="FFFFFF"/>
+                </a:solidFill>
+              </a14:hiddenFill>
+            </a:ext>
+          </a:extLst>
+        </p:spPr>
+      </p:pic>
+    </p:spTree>
+    <p:extLst>
+      <p:ext uri="{BB962C8B-B14F-4D97-AF65-F5344CB8AC3E}">
+        <p14:creationId xmlns:p14="http://schemas.microsoft.com/office/powerpoint/2010/main" val="1491691568"/>
+      </p:ext>
+    </p:extLst>
+  </p:cSld>
+  <p:clrMapOvr>
+    <a:masterClrMapping/>
+  </p:clrMapOvr>
+  <p:timing>
+    <p:tnLst>
+      <p:par>
+        <p:cTn id="1" dur="indefinite" restart="never" nodeType="tmRoot"/>
+      </p:par>
+    </p:tnLst>
+  </p:timing>
+</p:sld>
+</file>
+
 <file path=ppt/slides/slide2.xml><?xml version="1.0" encoding="utf-8"?>
 <p:sld xmlns:a="http://schemas.openxmlformats.org/drawingml/2006/main" xmlns:r="http://schemas.openxmlformats.org/officeDocument/2006/relationships" xmlns:p="http://schemas.openxmlformats.org/presentationml/2006/main">
   <p:cSld>
@@ -8355,40 +9051,42 @@
         </p:nvSpPr>
         <p:spPr/>
         <p:txBody>
-          <a:bodyPr/>
-          <a:lstStyle/>
-          <a:p>
-            <a:r>
-              <a:rPr lang="en-US" dirty="0" smtClean="0"/>
+          <a:bodyPr>
+            <a:normAutofit/>
+          </a:bodyPr>
+          <a:lstStyle/>
+          <a:p>
+            <a:r>
+              <a:rPr lang="en-US" sz="2800" dirty="0" smtClean="0"/>
               <a:t>Define NLP</a:t>
             </a:r>
           </a:p>
           <a:p>
             <a:r>
-              <a:rPr lang="en-US" dirty="0" smtClean="0"/>
+              <a:rPr lang="en-US" sz="2800" dirty="0" smtClean="0"/>
               <a:t>Determine purpose of NLP</a:t>
             </a:r>
           </a:p>
           <a:p>
             <a:r>
-              <a:rPr lang="en-US" dirty="0" smtClean="0"/>
+              <a:rPr lang="en-US" sz="2800" dirty="0" smtClean="0"/>
               <a:t>Intro to low-level NLP tasks</a:t>
             </a:r>
           </a:p>
           <a:p>
             <a:r>
-              <a:rPr lang="en-US" dirty="0" smtClean="0"/>
+              <a:rPr lang="en-US" sz="2800" dirty="0" smtClean="0"/>
               <a:t>Dive into a </a:t>
             </a:r>
             <a:r>
-              <a:rPr lang="en-US" dirty="0" err="1" smtClean="0"/>
+              <a:rPr lang="en-US" sz="2800" dirty="0" err="1" smtClean="0"/>
               <a:t>fewhigh</a:t>
             </a:r>
             <a:r>
-              <a:rPr lang="en-US" dirty="0" smtClean="0"/>
+              <a:rPr lang="en-US" sz="2800" dirty="0" smtClean="0"/>
               <a:t>-level NLP tasks</a:t>
             </a:r>
-            <a:endParaRPr lang="en-US" dirty="0"/>
+            <a:endParaRPr lang="en-US" sz="2800" dirty="0"/>
           </a:p>
         </p:txBody>
       </p:sp>
@@ -8402,6 +9100,13 @@
   <p:clrMapOvr>
     <a:masterClrMapping/>
   </p:clrMapOvr>
+  <p:timing>
+    <p:tnLst>
+      <p:par>
+        <p:cTn id="1" dur="indefinite" restart="never" nodeType="tmRoot"/>
+      </p:par>
+    </p:tnLst>
+  </p:timing>
 </p:sld>
 </file>
 
@@ -8457,26 +9162,28 @@
         </p:nvSpPr>
         <p:spPr/>
         <p:txBody>
-          <a:bodyPr/>
-          <a:lstStyle/>
-          <a:p>
-            <a:r>
-              <a:rPr lang="en-US" dirty="0" smtClean="0"/>
+          <a:bodyPr>
+            <a:normAutofit/>
+          </a:bodyPr>
+          <a:lstStyle/>
+          <a:p>
+            <a:r>
+              <a:rPr lang="en-US" sz="2800" dirty="0" smtClean="0"/>
               <a:t>NATURAL:  human based, human created</a:t>
             </a:r>
           </a:p>
           <a:p>
             <a:r>
-              <a:rPr lang="en-US" dirty="0" smtClean="0"/>
+              <a:rPr lang="en-US" sz="2800" dirty="0" smtClean="0"/>
               <a:t>LANGUAGE: grammar and lexicon (some rules and some words)</a:t>
             </a:r>
           </a:p>
           <a:p>
             <a:r>
-              <a:rPr lang="en-US" dirty="0" smtClean="0"/>
+              <a:rPr lang="en-US" sz="2800" dirty="0" smtClean="0"/>
               <a:t>PROCESSING : easy for humans, hard for computers</a:t>
             </a:r>
-            <a:endParaRPr lang="en-US" dirty="0"/>
+            <a:endParaRPr lang="en-US" sz="2800" dirty="0"/>
           </a:p>
         </p:txBody>
       </p:sp>
@@ -8532,7 +9239,11 @@
           <a:bodyPr/>
           <a:lstStyle/>
           <a:p>
-            <a:endParaRPr lang="en-US"/>
+            <a:r>
+              <a:rPr lang="en-US" dirty="0" smtClean="0"/>
+              <a:t>What’s the goal?</a:t>
+            </a:r>
+            <a:endParaRPr lang="en-US" dirty="0"/>
           </a:p>
         </p:txBody>
       </p:sp>
@@ -8548,36 +9259,29 @@
         </p:nvSpPr>
         <p:spPr/>
         <p:txBody>
-          <a:bodyPr/>
-          <a:lstStyle/>
-          <a:p>
-            <a:r>
-              <a:rPr lang="en-US" i="1" dirty="0"/>
-              <a:t>“Environmental regulators grill business owner over illegal coal fires.”</a:t>
-            </a:r>
-            <a:endParaRPr lang="en-US" dirty="0"/>
-          </a:p>
-          <a:p>
-            <a:r>
-              <a:rPr lang="en-US" dirty="0" smtClean="0"/>
-              <a:t>“Do you think it’s cold in here?”</a:t>
-            </a:r>
-          </a:p>
-          <a:p>
-            <a:r>
-              <a:rPr lang="en-US" dirty="0" smtClean="0"/>
-              <a:t>“What did you do this weekend?”</a:t>
-            </a:r>
-          </a:p>
-          <a:p>
-            <a:endParaRPr lang="en-US" dirty="0"/>
+          <a:bodyPr>
+            <a:normAutofit/>
+          </a:bodyPr>
+          <a:lstStyle/>
+          <a:p>
+            <a:r>
+              <a:rPr lang="en-US" sz="2800" dirty="0" smtClean="0"/>
+              <a:t>Get a machine to understand human language (Add structure to a highly unstructured data source)</a:t>
+            </a:r>
+          </a:p>
+          <a:p>
+            <a:r>
+              <a:rPr lang="en-US" sz="2800" dirty="0" smtClean="0"/>
+              <a:t>Do stuff with that ability!</a:t>
+            </a:r>
+            <a:endParaRPr lang="en-US" sz="2800" dirty="0"/>
           </a:p>
         </p:txBody>
       </p:sp>
     </p:spTree>
     <p:extLst>
       <p:ext uri="{BB962C8B-B14F-4D97-AF65-F5344CB8AC3E}">
-        <p14:creationId xmlns:p14="http://schemas.microsoft.com/office/powerpoint/2010/main" val="1934738211"/>
+        <p14:creationId xmlns:p14="http://schemas.microsoft.com/office/powerpoint/2010/main" val="701770054"/>
       </p:ext>
     </p:extLst>
   </p:cSld>
@@ -8645,6 +9349,100 @@
           <a:bodyPr/>
           <a:lstStyle/>
           <a:p>
+            <a:r>
+              <a:rPr lang="en-US" sz="2800" i="1" dirty="0"/>
+              <a:t>“Environmental regulators grill business owner over illegal coal fires.”</a:t>
+            </a:r>
+            <a:endParaRPr lang="en-US" sz="2800" dirty="0"/>
+          </a:p>
+          <a:p>
+            <a:r>
+              <a:rPr lang="en-US" sz="2800" dirty="0" smtClean="0"/>
+              <a:t>“Do you think it’s cold in here?”</a:t>
+            </a:r>
+          </a:p>
+          <a:p>
+            <a:r>
+              <a:rPr lang="en-US" sz="2800" dirty="0" smtClean="0"/>
+              <a:t>“What did you do this weekend?”</a:t>
+            </a:r>
+          </a:p>
+          <a:p>
+            <a:endParaRPr lang="en-US" dirty="0"/>
+          </a:p>
+        </p:txBody>
+      </p:sp>
+    </p:spTree>
+    <p:extLst>
+      <p:ext uri="{BB962C8B-B14F-4D97-AF65-F5344CB8AC3E}">
+        <p14:creationId xmlns:p14="http://schemas.microsoft.com/office/powerpoint/2010/main" val="1934738211"/>
+      </p:ext>
+    </p:extLst>
+  </p:cSld>
+  <p:clrMapOvr>
+    <a:masterClrMapping/>
+  </p:clrMapOvr>
+  <p:timing>
+    <p:tnLst>
+      <p:par>
+        <p:cTn id="1" dur="indefinite" restart="never" nodeType="tmRoot"/>
+      </p:par>
+    </p:tnLst>
+  </p:timing>
+</p:sld>
+</file>
+
+<file path=ppt/slides/slide7.xml><?xml version="1.0" encoding="utf-8"?>
+<p:sld xmlns:a="http://schemas.openxmlformats.org/drawingml/2006/main" xmlns:r="http://schemas.openxmlformats.org/officeDocument/2006/relationships" xmlns:p="http://schemas.openxmlformats.org/presentationml/2006/main">
+  <p:cSld>
+    <p:spTree>
+      <p:nvGrpSpPr>
+        <p:cNvPr id="1" name=""/>
+        <p:cNvGrpSpPr/>
+        <p:nvPr/>
+      </p:nvGrpSpPr>
+      <p:grpSpPr>
+        <a:xfrm>
+          <a:off x="0" y="0"/>
+          <a:ext cx="0" cy="0"/>
+          <a:chOff x="0" y="0"/>
+          <a:chExt cx="0" cy="0"/>
+        </a:xfrm>
+      </p:grpSpPr>
+      <p:sp>
+        <p:nvSpPr>
+          <p:cNvPr id="2" name="Title 1"/>
+          <p:cNvSpPr>
+            <a:spLocks noGrp="1"/>
+          </p:cNvSpPr>
+          <p:nvPr>
+            <p:ph type="title"/>
+          </p:nvPr>
+        </p:nvSpPr>
+        <p:spPr/>
+        <p:txBody>
+          <a:bodyPr/>
+          <a:lstStyle/>
+          <a:p>
+            <a:endParaRPr lang="en-US"/>
+          </a:p>
+        </p:txBody>
+      </p:sp>
+      <p:sp>
+        <p:nvSpPr>
+          <p:cNvPr id="3" name="Content Placeholder 2"/>
+          <p:cNvSpPr>
+            <a:spLocks noGrp="1"/>
+          </p:cNvSpPr>
+          <p:nvPr>
+            <p:ph idx="1"/>
+          </p:nvPr>
+        </p:nvSpPr>
+        <p:spPr/>
+        <p:txBody>
+          <a:bodyPr/>
+          <a:lstStyle/>
+          <a:p>
             <a:endParaRPr lang="en-US"/>
           </a:p>
         </p:txBody>
@@ -8710,95 +9508,6 @@
 </p:sld>
 </file>
 
-<file path=ppt/slides/slide7.xml><?xml version="1.0" encoding="utf-8"?>
-<p:sld xmlns:a="http://schemas.openxmlformats.org/drawingml/2006/main" xmlns:r="http://schemas.openxmlformats.org/officeDocument/2006/relationships" xmlns:p="http://schemas.openxmlformats.org/presentationml/2006/main">
-  <p:cSld>
-    <p:spTree>
-      <p:nvGrpSpPr>
-        <p:cNvPr id="1" name=""/>
-        <p:cNvGrpSpPr/>
-        <p:nvPr/>
-      </p:nvGrpSpPr>
-      <p:grpSpPr>
-        <a:xfrm>
-          <a:off x="0" y="0"/>
-          <a:ext cx="0" cy="0"/>
-          <a:chOff x="0" y="0"/>
-          <a:chExt cx="0" cy="0"/>
-        </a:xfrm>
-      </p:grpSpPr>
-      <p:sp>
-        <p:nvSpPr>
-          <p:cNvPr id="2" name="Title 1"/>
-          <p:cNvSpPr>
-            <a:spLocks noGrp="1"/>
-          </p:cNvSpPr>
-          <p:nvPr>
-            <p:ph type="title"/>
-          </p:nvPr>
-        </p:nvSpPr>
-        <p:spPr/>
-        <p:txBody>
-          <a:bodyPr/>
-          <a:lstStyle/>
-          <a:p>
-            <a:r>
-              <a:rPr lang="en-US" dirty="0" smtClean="0"/>
-              <a:t>What’s the goal?</a:t>
-            </a:r>
-            <a:endParaRPr lang="en-US" dirty="0"/>
-          </a:p>
-        </p:txBody>
-      </p:sp>
-      <p:sp>
-        <p:nvSpPr>
-          <p:cNvPr id="3" name="Content Placeholder 2"/>
-          <p:cNvSpPr>
-            <a:spLocks noGrp="1"/>
-          </p:cNvSpPr>
-          <p:nvPr>
-            <p:ph idx="1"/>
-          </p:nvPr>
-        </p:nvSpPr>
-        <p:spPr/>
-        <p:txBody>
-          <a:bodyPr/>
-          <a:lstStyle/>
-          <a:p>
-            <a:r>
-              <a:rPr lang="en-US" dirty="0" smtClean="0"/>
-              <a:t>Get a machine to understand human language (Add structure to a highly unstructured data source)</a:t>
-            </a:r>
-          </a:p>
-          <a:p>
-            <a:r>
-              <a:rPr lang="en-US" dirty="0" smtClean="0"/>
-              <a:t>Do stuff with that ability!</a:t>
-            </a:r>
-            <a:endParaRPr lang="en-US" dirty="0"/>
-          </a:p>
-        </p:txBody>
-      </p:sp>
-    </p:spTree>
-    <p:extLst>
-      <p:ext uri="{BB962C8B-B14F-4D97-AF65-F5344CB8AC3E}">
-        <p14:creationId xmlns:p14="http://schemas.microsoft.com/office/powerpoint/2010/main" val="701770054"/>
-      </p:ext>
-    </p:extLst>
-  </p:cSld>
-  <p:clrMapOvr>
-    <a:masterClrMapping/>
-  </p:clrMapOvr>
-  <p:timing>
-    <p:tnLst>
-      <p:par>
-        <p:cTn id="1" dur="indefinite" restart="never" nodeType="tmRoot"/>
-      </p:par>
-    </p:tnLst>
-  </p:timing>
-</p:sld>
-</file>
-
 <file path=ppt/slides/slide8.xml><?xml version="1.0" encoding="utf-8"?>
 <p:sld xmlns:a="http://schemas.openxmlformats.org/drawingml/2006/main" xmlns:r="http://schemas.openxmlformats.org/officeDocument/2006/relationships" xmlns:p="http://schemas.openxmlformats.org/presentationml/2006/main">
   <p:cSld>
@@ -8851,33 +9560,52 @@
         </p:nvSpPr>
         <p:spPr/>
         <p:txBody>
-          <a:bodyPr/>
-          <a:lstStyle/>
-          <a:p>
-            <a:r>
-              <a:rPr lang="en-US" dirty="0"/>
+          <a:bodyPr>
+            <a:normAutofit/>
+          </a:bodyPr>
+          <a:lstStyle/>
+          <a:p>
+            <a:r>
+              <a:rPr lang="en-US" sz="2800" dirty="0"/>
               <a:t>Bayesian spam </a:t>
             </a:r>
             <a:r>
-              <a:rPr lang="en-US" dirty="0" smtClean="0"/>
+              <a:rPr lang="en-US" sz="2800" dirty="0" smtClean="0"/>
               <a:t>filtering</a:t>
             </a:r>
           </a:p>
           <a:p>
             <a:r>
-              <a:rPr lang="en-US" dirty="0"/>
-              <a:t>automatic transcript of the voicemail </a:t>
-            </a:r>
-            <a:endParaRPr lang="en-US" dirty="0" smtClean="0"/>
-          </a:p>
-          <a:p>
-            <a:r>
-              <a:rPr lang="en-US" dirty="0" smtClean="0">
+              <a:rPr lang="en-US" sz="2800" dirty="0" smtClean="0"/>
+              <a:t>Voicemail transcript</a:t>
+            </a:r>
+            <a:r>
+              <a:rPr lang="en-US" sz="2800" dirty="0"/>
+              <a:t> </a:t>
+            </a:r>
+            <a:endParaRPr lang="en-US" sz="2800" dirty="0" smtClean="0"/>
+          </a:p>
+          <a:p>
+            <a:r>
+              <a:rPr lang="en-US" sz="2800" dirty="0" err="1" smtClean="0"/>
+              <a:t>Woebot</a:t>
+            </a:r>
+            <a:endParaRPr lang="en-US" sz="2800" dirty="0" smtClean="0"/>
+          </a:p>
+          <a:p>
+            <a:r>
+              <a:rPr lang="en-US" sz="2800" dirty="0">
                 <a:hlinkClick r:id="rId3"/>
               </a:rPr>
-              <a:t>sepsis early intervention</a:t>
-            </a:r>
-            <a:endParaRPr lang="en-US" dirty="0"/>
+              <a:t>S</a:t>
+            </a:r>
+            <a:r>
+              <a:rPr lang="en-US" sz="2800" dirty="0" smtClean="0">
+                <a:hlinkClick r:id="rId3"/>
+              </a:rPr>
+              <a:t>epsis early intervention</a:t>
+            </a:r>
+            <a:endParaRPr lang="en-US" sz="2800" dirty="0"/>
           </a:p>
         </p:txBody>
       </p:sp>
@@ -8983,35 +9711,37 @@
         </p:nvSpPr>
         <p:spPr/>
         <p:txBody>
-          <a:bodyPr/>
-          <a:lstStyle/>
-          <a:p>
-            <a:r>
-              <a:rPr lang="en-US" dirty="0" smtClean="0"/>
+          <a:bodyPr>
+            <a:normAutofit/>
+          </a:bodyPr>
+          <a:lstStyle/>
+          <a:p>
+            <a:r>
+              <a:rPr lang="en-US" sz="2800" dirty="0" smtClean="0"/>
               <a:t>Tokenizing</a:t>
             </a:r>
           </a:p>
           <a:p>
             <a:r>
-              <a:rPr lang="en-US" dirty="0" smtClean="0"/>
+              <a:rPr lang="en-US" sz="2800" dirty="0" smtClean="0"/>
               <a:t>Parsing</a:t>
             </a:r>
           </a:p>
           <a:p>
             <a:r>
-              <a:rPr lang="en-US" dirty="0" smtClean="0"/>
+              <a:rPr lang="en-US" sz="2800" dirty="0" smtClean="0"/>
               <a:t>Lemmatization &amp; Stemming</a:t>
             </a:r>
           </a:p>
           <a:p>
             <a:r>
-              <a:rPr lang="en-US" dirty="0" smtClean="0"/>
+              <a:rPr lang="en-US" sz="2800" dirty="0" smtClean="0"/>
               <a:t>Part-of-Speech Tagging</a:t>
             </a:r>
           </a:p>
           <a:p>
             <a:r>
-              <a:rPr lang="en-US" dirty="0" smtClean="0"/>
+              <a:rPr lang="en-US" sz="2800" dirty="0" smtClean="0"/>
               <a:t>Language Detection</a:t>
             </a:r>
           </a:p>

</xml_diff>